<commit_message>
adding one slide version of s&h
</commit_message>
<xml_diff>
--- a/presentations/searchhyper.pptx
+++ b/presentations/searchhyper.pptx
@@ -111,7 +111,7 @@
   </p:defaultTextStyle>
   <p:extLst>
     <p:ext uri="{EFAFB233-063F-42B5-8137-9DF3F51BA10A}">
-      <p15:sldGuideLst xmlns:p15="http://schemas.microsoft.com/office/powerpoint/2012/main" xmlns="">
+      <p15:sldGuideLst xmlns="" xmlns:p15="http://schemas.microsoft.com/office/powerpoint/2012/main">
         <p15:guide id="1" orient="horz" pos="2160">
           <p15:clr>
             <a:srgbClr val="A4A3A4"/>
@@ -3022,7 +3022,7 @@
         </p:nvCxnSpPr>
         <p:spPr>
           <a:xfrm>
-            <a:off x="4310976" y="2573689"/>
+            <a:off x="4310976" y="3156920"/>
             <a:ext cx="927163" cy="537678"/>
           </a:xfrm>
           <a:prstGeom prst="straightConnector1">
@@ -3055,7 +3055,7 @@
         </p:nvGrpSpPr>
         <p:grpSpPr>
           <a:xfrm>
-            <a:off x="2868499" y="2568234"/>
+            <a:off x="2868499" y="3151465"/>
             <a:ext cx="3758411" cy="1489867"/>
             <a:chOff x="4097586" y="2203252"/>
             <a:chExt cx="3758411" cy="1489867"/>
@@ -3417,7 +3417,7 @@
         </p:nvSpPr>
         <p:spPr>
           <a:xfrm>
-            <a:off x="901375" y="282296"/>
+            <a:off x="901375" y="865527"/>
             <a:ext cx="7126545" cy="369332"/>
           </a:xfrm>
           <a:prstGeom prst="rect">
@@ -3479,7 +3479,7 @@
         </p:nvSpPr>
         <p:spPr>
           <a:xfrm rot="5400000" flipH="1">
-            <a:off x="5129915" y="2777585"/>
+            <a:off x="5129915" y="3360816"/>
             <a:ext cx="173748" cy="1094704"/>
           </a:xfrm>
           <a:prstGeom prst="rightBrace">
@@ -3522,7 +3522,7 @@
         </p:nvSpPr>
         <p:spPr>
           <a:xfrm>
-            <a:off x="897467" y="1147873"/>
+            <a:off x="897467" y="1731104"/>
             <a:ext cx="1936306" cy="646331"/>
           </a:xfrm>
           <a:prstGeom prst="rect">
@@ -3574,7 +3574,7 @@
         </p:nvCxnSpPr>
         <p:spPr>
           <a:xfrm flipH="1">
-            <a:off x="2426790" y="657997"/>
+            <a:off x="2426790" y="1241228"/>
             <a:ext cx="333068" cy="417532"/>
           </a:xfrm>
           <a:prstGeom prst="straightConnector1">
@@ -3607,7 +3607,7 @@
         </p:nvSpPr>
         <p:spPr>
           <a:xfrm>
-            <a:off x="2585502" y="2205418"/>
+            <a:off x="2585502" y="2788649"/>
             <a:ext cx="2610661" cy="369332"/>
           </a:xfrm>
           <a:prstGeom prst="rect">
@@ -3653,7 +3653,7 @@
         </p:nvCxnSpPr>
         <p:spPr>
           <a:xfrm>
-            <a:off x="2470714" y="1877964"/>
+            <a:off x="2470714" y="2461195"/>
             <a:ext cx="324847" cy="310353"/>
           </a:xfrm>
           <a:prstGeom prst="straightConnector1">
@@ -3686,7 +3686,7 @@
         </p:nvGrpSpPr>
         <p:grpSpPr>
           <a:xfrm>
-            <a:off x="669775" y="4292050"/>
+            <a:off x="669775" y="4875281"/>
             <a:ext cx="3758411" cy="1489867"/>
             <a:chOff x="752641" y="3922718"/>
             <a:chExt cx="3758411" cy="1489867"/>
@@ -4961,7 +4961,7 @@
         </p:nvCxnSpPr>
         <p:spPr>
           <a:xfrm flipH="1">
-            <a:off x="4158576" y="4079485"/>
+            <a:off x="4158576" y="4662716"/>
             <a:ext cx="435618" cy="356519"/>
           </a:xfrm>
           <a:prstGeom prst="straightConnector1">
@@ -4994,7 +4994,7 @@
         </p:nvSpPr>
         <p:spPr>
           <a:xfrm>
-            <a:off x="5238138" y="4637771"/>
+            <a:off x="5238138" y="5221002"/>
             <a:ext cx="3467980" cy="1200329"/>
           </a:xfrm>
           <a:prstGeom prst="rect">
@@ -5084,7 +5084,7 @@
         </p:nvCxnSpPr>
         <p:spPr>
           <a:xfrm>
-            <a:off x="4594194" y="5024136"/>
+            <a:off x="4594194" y="5607367"/>
             <a:ext cx="518719" cy="0"/>
           </a:xfrm>
           <a:prstGeom prst="straightConnector1">
@@ -5117,7 +5117,7 @@
         </p:nvSpPr>
         <p:spPr>
           <a:xfrm>
-            <a:off x="3150763" y="1147873"/>
+            <a:off x="3150763" y="1731104"/>
             <a:ext cx="1962150" cy="646331"/>
           </a:xfrm>
           <a:prstGeom prst="rect">
@@ -5185,7 +5185,7 @@
         </p:nvSpPr>
         <p:spPr>
           <a:xfrm>
-            <a:off x="5441576" y="1147873"/>
+            <a:off x="5441576" y="1731104"/>
             <a:ext cx="1916595" cy="646331"/>
           </a:xfrm>
           <a:prstGeom prst="rect">
@@ -5264,7 +5264,7 @@
         </p:nvSpPr>
         <p:spPr>
           <a:xfrm>
-            <a:off x="7771611" y="1424311"/>
+            <a:off x="7771611" y="2007542"/>
             <a:ext cx="343364" cy="369332"/>
           </a:xfrm>
           <a:prstGeom prst="rect">
@@ -5294,7 +5294,7 @@
         </p:nvCxnSpPr>
         <p:spPr>
           <a:xfrm flipH="1">
-            <a:off x="3862363" y="651628"/>
+            <a:off x="3862363" y="1234859"/>
             <a:ext cx="100884" cy="423901"/>
           </a:xfrm>
           <a:prstGeom prst="straightConnector1">
@@ -5327,7 +5327,7 @@
         </p:nvCxnSpPr>
         <p:spPr>
           <a:xfrm>
-            <a:off x="5310037" y="638220"/>
+            <a:off x="5310037" y="1221451"/>
             <a:ext cx="955296" cy="437309"/>
           </a:xfrm>
           <a:prstGeom prst="straightConnector1">
@@ -5352,6 +5352,59 @@
           </a:fontRef>
         </p:style>
       </p:cxnSp>
+      <p:sp>
+        <p:nvSpPr>
+          <p:cNvPr id="3" name="Rectangle 2"/>
+          <p:cNvSpPr/>
+          <p:nvPr/>
+        </p:nvSpPr>
+        <p:spPr>
+          <a:xfrm>
+            <a:off x="60948" y="40899"/>
+            <a:ext cx="9083052" cy="1200328"/>
+          </a:xfrm>
+          <a:prstGeom prst="rect">
+            <a:avLst/>
+          </a:prstGeom>
+        </p:spPr>
+        <p:txBody>
+          <a:bodyPr wrap="square">
+            <a:spAutoFit/>
+          </a:bodyPr>
+          <a:lstStyle/>
+          <a:p>
+            <a:pPr algn="ctr"/>
+            <a:r>
+              <a:rPr lang="en-GB" sz="2400" dirty="0">
+                <a:latin typeface="Digital Strip"/>
+                <a:cs typeface="Digital Strip"/>
+              </a:rPr>
+              <a:t>A Unified, Modular and Multimodal Approach to Search and </a:t>
+            </a:r>
+            <a:r>
+              <a:rPr lang="en-GB" sz="2400" dirty="0" smtClean="0">
+                <a:latin typeface="Digital Strip"/>
+                <a:cs typeface="Digital Strip"/>
+              </a:rPr>
+              <a:t>Hyperlinking </a:t>
+            </a:r>
+            <a:r>
+              <a:rPr lang="en-GB" sz="2400" dirty="0">
+                <a:latin typeface="Digital Strip"/>
+                <a:cs typeface="Digital Strip"/>
+              </a:rPr>
+              <a:t>Video</a:t>
+            </a:r>
+          </a:p>
+          <a:p>
+            <a:pPr algn="ctr"/>
+            <a:endParaRPr lang="en-GB" sz="2400" dirty="0">
+              <a:latin typeface="Digital Strip"/>
+              <a:cs typeface="Digital Strip"/>
+            </a:endParaRPr>
+          </a:p>
+        </p:txBody>
+      </p:sp>
     </p:spTree>
     <p:extLst>
       <p:ext uri="{BB962C8B-B14F-4D97-AF65-F5344CB8AC3E}">
@@ -6047,7 +6100,7 @@
   <a:extraClrSchemeLst/>
   <a:extLst>
     <a:ext uri="{05A4C25C-085E-4340-85A3-A5531E510DB2}">
-      <thm15:themeFamily xmlns:thm15="http://schemas.microsoft.com/office/thememl/2012/main" xmlns="" name="Office Theme" id="{62F939B6-93AF-4DB8-9C6B-D6C7DFDC589F}" vid="{4A3C46E8-61CC-4603-A589-7422A47A8E4A}"/>
+      <thm15:themeFamily xmlns="" xmlns:thm15="http://schemas.microsoft.com/office/thememl/2012/main" name="Office Theme" id="{62F939B6-93AF-4DB8-9C6B-D6C7DFDC589F}" vid="{4A3C46E8-61CC-4603-A589-7422A47A8E4A}"/>
     </a:ext>
   </a:extLst>
 </a:theme>

</xml_diff>